<commit_message>
change cober image and tweeks on readme
</commit_message>
<xml_diff>
--- a/img/Aldeia da Serra Project.pptx
+++ b/img/Aldeia da Serra Project.pptx
@@ -2646,7 +2646,7 @@
         </p:blipFill>
         <p:spPr>
           <a:xfrm>
-            <a:off x="-25400" y="-33020"/>
+            <a:off x="-26035" y="330200"/>
             <a:ext cx="12243435" cy="7646035"/>
           </a:xfrm>
           <a:prstGeom prst="rect">
@@ -2753,6 +2753,16 @@
           <a:p>
             <a:pPr algn="ctr"/>
             <a:r>
+              <a:rPr lang="" altLang="en-US" sz="4400" b="1">
+                <a:solidFill>
+                  <a:schemeClr val="bg1"/>
+                </a:solidFill>
+                <a:latin typeface="Gubbi" panose="00000400000000000000" charset="0"/>
+                <a:cs typeface="Gubbi" panose="00000400000000000000" charset="0"/>
+              </a:rPr>
+              <a:t>s</a:t>
+            </a:r>
+            <a:r>
               <a:rPr lang="en-US" altLang="en-US" sz="4400" b="1">
                 <a:solidFill>
                   <a:schemeClr val="bg1"/>
@@ -2760,9 +2770,19 @@
                 <a:latin typeface="Gubbi" panose="00000400000000000000" charset="0"/>
                 <a:cs typeface="Gubbi" panose="00000400000000000000" charset="0"/>
               </a:rPr>
-              <a:t>web scraping</a:t>
-            </a:r>
-            <a:endParaRPr lang="en-US" altLang="en-US" sz="4400" b="1">
+              <a:t>craping </a:t>
+            </a:r>
+            <a:r>
+              <a:rPr lang="" altLang="en-US" sz="4400" b="1">
+                <a:solidFill>
+                  <a:schemeClr val="bg1"/>
+                </a:solidFill>
+                <a:latin typeface="Gubbi" panose="00000400000000000000" charset="0"/>
+                <a:cs typeface="Gubbi" panose="00000400000000000000" charset="0"/>
+              </a:rPr>
+              <a:t>| etl | eda | ml | deploy</a:t>
+            </a:r>
+            <a:endParaRPr lang="" altLang="en-US" sz="4400" b="1">
               <a:solidFill>
                 <a:schemeClr val="bg1"/>
               </a:solidFill>

</xml_diff>

<commit_message>
added part ii - cleaning
</commit_message>
<xml_diff>
--- a/img/Aldeia da Serra Project.pptx
+++ b/img/Aldeia da Serra Project.pptx
@@ -4,10 +4,14 @@
   <p:sldMasterIdLst>
     <p:sldMasterId id="2147483648" r:id="rId1"/>
   </p:sldMasterIdLst>
+  <p:notesMasterIdLst>
+    <p:notesMasterId r:id="rId7"/>
+  </p:notesMasterIdLst>
   <p:sldIdLst>
     <p:sldId id="256" r:id="rId3"/>
     <p:sldId id="259" r:id="rId4"/>
     <p:sldId id="260" r:id="rId5"/>
+    <p:sldId id="261" r:id="rId6"/>
   </p:sldIdLst>
   <p:sldSz cx="12192000" cy="6858000"/>
   <p:notesSz cx="7103745" cy="10234295"/>
@@ -109,6 +113,397 @@
 </p:presentation>
 </file>
 
+<file path=ppt/notesMasters/notesMaster1.xml><?xml version="1.0" encoding="utf-8"?>
+<p:notesMaster xmlns:a="http://schemas.openxmlformats.org/drawingml/2006/main" xmlns:r="http://schemas.openxmlformats.org/officeDocument/2006/relationships" xmlns:p="http://schemas.openxmlformats.org/presentationml/2006/main">
+  <p:cSld>
+    <p:bg>
+      <p:bgRef idx="1001">
+        <a:schemeClr val="bg1"/>
+      </p:bgRef>
+    </p:bg>
+    <p:spTree>
+      <p:nvGrpSpPr>
+        <p:cNvPr id="1" name=""/>
+        <p:cNvGrpSpPr/>
+        <p:nvPr/>
+      </p:nvGrpSpPr>
+      <p:grpSpPr>
+        <a:xfrm>
+          <a:off x="0" y="0"/>
+          <a:ext cx="0" cy="0"/>
+          <a:chOff x="0" y="0"/>
+          <a:chExt cx="0" cy="0"/>
+        </a:xfrm>
+      </p:grpSpPr>
+      <p:sp>
+        <p:nvSpPr>
+          <p:cNvPr id="2" name="Header Placeholder 1"/>
+          <p:cNvSpPr>
+            <a:spLocks noGrp="1"/>
+          </p:cNvSpPr>
+          <p:nvPr>
+            <p:ph type="hdr" sz="quarter"/>
+          </p:nvPr>
+        </p:nvSpPr>
+        <p:spPr>
+          <a:xfrm>
+            <a:off x="0" y="0"/>
+            <a:ext cx="3078290" cy="513492"/>
+          </a:xfrm>
+          <a:prstGeom prst="rect">
+            <a:avLst/>
+          </a:prstGeom>
+        </p:spPr>
+        <p:txBody>
+          <a:bodyPr vert="horz" lIns="91440" tIns="45720" rIns="91440" bIns="45720" rtlCol="0"/>
+          <a:lstStyle>
+            <a:lvl1pPr algn="l">
+              <a:defRPr sz="1200"/>
+            </a:lvl1pPr>
+          </a:lstStyle>
+          <a:p>
+            <a:endParaRPr lang="en-US"/>
+          </a:p>
+        </p:txBody>
+      </p:sp>
+      <p:sp>
+        <p:nvSpPr>
+          <p:cNvPr id="3" name="Date Placeholder 2"/>
+          <p:cNvSpPr>
+            <a:spLocks noGrp="1"/>
+          </p:cNvSpPr>
+          <p:nvPr>
+            <p:ph type="dt" idx="1"/>
+          </p:nvPr>
+        </p:nvSpPr>
+        <p:spPr>
+          <a:xfrm>
+            <a:off x="4023812" y="0"/>
+            <a:ext cx="3078290" cy="513492"/>
+          </a:xfrm>
+          <a:prstGeom prst="rect">
+            <a:avLst/>
+          </a:prstGeom>
+        </p:spPr>
+        <p:txBody>
+          <a:bodyPr vert="horz" lIns="91440" tIns="45720" rIns="91440" bIns="45720" rtlCol="0"/>
+          <a:lstStyle>
+            <a:lvl1pPr algn="r">
+              <a:defRPr sz="1200"/>
+            </a:lvl1pPr>
+          </a:lstStyle>
+          <a:p>
+            <a:fld id="{3EFD42F7-718C-4B98-AAEC-167E6DDD60A7}" type="datetimeFigureOut">
+              <a:rPr lang="en-US" smtClean="0"/>
+            </a:fld>
+            <a:endParaRPr lang="en-US"/>
+          </a:p>
+        </p:txBody>
+      </p:sp>
+      <p:sp>
+        <p:nvSpPr>
+          <p:cNvPr id="4" name="Slide Image Placeholder 3"/>
+          <p:cNvSpPr>
+            <a:spLocks noGrp="1" noRot="1" noChangeAspect="1"/>
+          </p:cNvSpPr>
+          <p:nvPr>
+            <p:ph type="sldImg" idx="2"/>
+          </p:nvPr>
+        </p:nvSpPr>
+        <p:spPr>
+          <a:xfrm>
+            <a:off x="481584" y="1279287"/>
+            <a:ext cx="6140577" cy="3454075"/>
+          </a:xfrm>
+          <a:prstGeom prst="rect">
+            <a:avLst/>
+          </a:prstGeom>
+          <a:noFill/>
+          <a:ln w="12700">
+            <a:solidFill>
+              <a:prstClr val="black"/>
+            </a:solidFill>
+          </a:ln>
+        </p:spPr>
+        <p:txBody>
+          <a:bodyPr vert="horz" lIns="91440" tIns="45720" rIns="91440" bIns="45720" rtlCol="0" anchor="ctr"/>
+          <a:lstStyle/>
+          <a:p>
+            <a:endParaRPr lang="en-US"/>
+          </a:p>
+        </p:txBody>
+      </p:sp>
+      <p:sp>
+        <p:nvSpPr>
+          <p:cNvPr id="5" name="Notes Placeholder 4"/>
+          <p:cNvSpPr>
+            <a:spLocks noGrp="1"/>
+          </p:cNvSpPr>
+          <p:nvPr>
+            <p:ph type="body" sz="quarter" idx="3"/>
+          </p:nvPr>
+        </p:nvSpPr>
+        <p:spPr>
+          <a:xfrm>
+            <a:off x="710375" y="4925254"/>
+            <a:ext cx="5682996" cy="4029754"/>
+          </a:xfrm>
+          <a:prstGeom prst="rect">
+            <a:avLst/>
+          </a:prstGeom>
+        </p:spPr>
+        <p:txBody>
+          <a:bodyPr vert="horz" lIns="91440" tIns="45720" rIns="91440" bIns="45720" rtlCol="0"/>
+          <a:lstStyle/>
+          <a:p>
+            <a:pPr lvl="0"/>
+            <a:r>
+              <a:rPr lang="en-US" smtClean="0"/>
+              <a:t>Click to edit Master text styles</a:t>
+            </a:r>
+            <a:endParaRPr lang="en-US" smtClean="0"/>
+          </a:p>
+          <a:p>
+            <a:pPr lvl="1"/>
+            <a:r>
+              <a:rPr lang="en-US" smtClean="0"/>
+              <a:t>Second level</a:t>
+            </a:r>
+            <a:endParaRPr lang="en-US" smtClean="0"/>
+          </a:p>
+          <a:p>
+            <a:pPr lvl="2"/>
+            <a:r>
+              <a:rPr lang="en-US" smtClean="0"/>
+              <a:t>Third level</a:t>
+            </a:r>
+            <a:endParaRPr lang="en-US" smtClean="0"/>
+          </a:p>
+          <a:p>
+            <a:pPr lvl="3"/>
+            <a:r>
+              <a:rPr lang="en-US" smtClean="0"/>
+              <a:t>Fourth level</a:t>
+            </a:r>
+            <a:endParaRPr lang="en-US" smtClean="0"/>
+          </a:p>
+          <a:p>
+            <a:pPr lvl="4"/>
+            <a:r>
+              <a:rPr lang="en-US" smtClean="0"/>
+              <a:t>Fifth level</a:t>
+            </a:r>
+            <a:endParaRPr lang="en-US"/>
+          </a:p>
+        </p:txBody>
+      </p:sp>
+      <p:sp>
+        <p:nvSpPr>
+          <p:cNvPr id="6" name="Footer Placeholder 5"/>
+          <p:cNvSpPr>
+            <a:spLocks noGrp="1"/>
+          </p:cNvSpPr>
+          <p:nvPr>
+            <p:ph type="ftr" sz="quarter" idx="4"/>
+          </p:nvPr>
+        </p:nvSpPr>
+        <p:spPr>
+          <a:xfrm>
+            <a:off x="0" y="9720804"/>
+            <a:ext cx="3078290" cy="513491"/>
+          </a:xfrm>
+          <a:prstGeom prst="rect">
+            <a:avLst/>
+          </a:prstGeom>
+        </p:spPr>
+        <p:txBody>
+          <a:bodyPr vert="horz" lIns="91440" tIns="45720" rIns="91440" bIns="45720" rtlCol="0" anchor="b"/>
+          <a:lstStyle>
+            <a:lvl1pPr algn="l">
+              <a:defRPr sz="1200"/>
+            </a:lvl1pPr>
+          </a:lstStyle>
+          <a:p>
+            <a:endParaRPr lang="en-US"/>
+          </a:p>
+        </p:txBody>
+      </p:sp>
+      <p:sp>
+        <p:nvSpPr>
+          <p:cNvPr id="7" name="Slide Number Placeholder 6"/>
+          <p:cNvSpPr>
+            <a:spLocks noGrp="1"/>
+          </p:cNvSpPr>
+          <p:nvPr>
+            <p:ph type="sldNum" sz="quarter" idx="5"/>
+          </p:nvPr>
+        </p:nvSpPr>
+        <p:spPr>
+          <a:xfrm>
+            <a:off x="4023812" y="9720804"/>
+            <a:ext cx="3078290" cy="513491"/>
+          </a:xfrm>
+          <a:prstGeom prst="rect">
+            <a:avLst/>
+          </a:prstGeom>
+        </p:spPr>
+        <p:txBody>
+          <a:bodyPr vert="horz" lIns="91440" tIns="45720" rIns="91440" bIns="45720" rtlCol="0" anchor="b"/>
+          <a:lstStyle>
+            <a:lvl1pPr algn="r">
+              <a:defRPr sz="1200"/>
+            </a:lvl1pPr>
+          </a:lstStyle>
+          <a:p>
+            <a:fld id="{21B2AA4F-B828-4D7C-AFD3-893933DAFCB4}" type="slidenum">
+              <a:rPr lang="en-US" smtClean="0"/>
+            </a:fld>
+            <a:endParaRPr lang="en-US"/>
+          </a:p>
+        </p:txBody>
+      </p:sp>
+    </p:spTree>
+  </p:cSld>
+  <p:clrMap bg1="lt1" tx1="dk1" bg2="lt2" tx2="dk2" accent1="accent1" accent2="accent2" accent3="accent3" accent4="accent4" accent5="accent5" accent6="accent6" hlink="hlink" folHlink="folHlink"/>
+  <p:notesStyle>
+    <a:lvl1pPr marL="0" algn="l" defTabSz="914400" rtl="0" eaLnBrk="1" latinLnBrk="0" hangingPunct="1">
+      <a:defRPr sz="1200" kern="1200">
+        <a:solidFill>
+          <a:schemeClr val="tx1"/>
+        </a:solidFill>
+        <a:latin typeface="+mn-lt"/>
+        <a:ea typeface="+mn-ea"/>
+        <a:cs typeface="+mn-cs"/>
+      </a:defRPr>
+    </a:lvl1pPr>
+    <a:lvl2pPr marL="457200" algn="l" defTabSz="914400" rtl="0" eaLnBrk="1" latinLnBrk="0" hangingPunct="1">
+      <a:defRPr sz="1200" kern="1200">
+        <a:solidFill>
+          <a:schemeClr val="tx1"/>
+        </a:solidFill>
+        <a:latin typeface="+mn-lt"/>
+        <a:ea typeface="+mn-ea"/>
+        <a:cs typeface="+mn-cs"/>
+      </a:defRPr>
+    </a:lvl2pPr>
+    <a:lvl3pPr marL="914400" algn="l" defTabSz="914400" rtl="0" eaLnBrk="1" latinLnBrk="0" hangingPunct="1">
+      <a:defRPr sz="1200" kern="1200">
+        <a:solidFill>
+          <a:schemeClr val="tx1"/>
+        </a:solidFill>
+        <a:latin typeface="+mn-lt"/>
+        <a:ea typeface="+mn-ea"/>
+        <a:cs typeface="+mn-cs"/>
+      </a:defRPr>
+    </a:lvl3pPr>
+    <a:lvl4pPr marL="1371600" algn="l" defTabSz="914400" rtl="0" eaLnBrk="1" latinLnBrk="0" hangingPunct="1">
+      <a:defRPr sz="1200" kern="1200">
+        <a:solidFill>
+          <a:schemeClr val="tx1"/>
+        </a:solidFill>
+        <a:latin typeface="+mn-lt"/>
+        <a:ea typeface="+mn-ea"/>
+        <a:cs typeface="+mn-cs"/>
+      </a:defRPr>
+    </a:lvl4pPr>
+    <a:lvl5pPr marL="1828800" algn="l" defTabSz="914400" rtl="0" eaLnBrk="1" latinLnBrk="0" hangingPunct="1">
+      <a:defRPr sz="1200" kern="1200">
+        <a:solidFill>
+          <a:schemeClr val="tx1"/>
+        </a:solidFill>
+        <a:latin typeface="+mn-lt"/>
+        <a:ea typeface="+mn-ea"/>
+        <a:cs typeface="+mn-cs"/>
+      </a:defRPr>
+    </a:lvl5pPr>
+    <a:lvl6pPr marL="2286000" algn="l" defTabSz="914400" rtl="0" eaLnBrk="1" latinLnBrk="0" hangingPunct="1">
+      <a:defRPr sz="1200" kern="1200">
+        <a:solidFill>
+          <a:schemeClr val="tx1"/>
+        </a:solidFill>
+        <a:latin typeface="+mn-lt"/>
+        <a:ea typeface="+mn-ea"/>
+        <a:cs typeface="+mn-cs"/>
+      </a:defRPr>
+    </a:lvl6pPr>
+    <a:lvl7pPr marL="2743200" algn="l" defTabSz="914400" rtl="0" eaLnBrk="1" latinLnBrk="0" hangingPunct="1">
+      <a:defRPr sz="1200" kern="1200">
+        <a:solidFill>
+          <a:schemeClr val="tx1"/>
+        </a:solidFill>
+        <a:latin typeface="+mn-lt"/>
+        <a:ea typeface="+mn-ea"/>
+        <a:cs typeface="+mn-cs"/>
+      </a:defRPr>
+    </a:lvl7pPr>
+    <a:lvl8pPr marL="3200400" algn="l" defTabSz="914400" rtl="0" eaLnBrk="1" latinLnBrk="0" hangingPunct="1">
+      <a:defRPr sz="1200" kern="1200">
+        <a:solidFill>
+          <a:schemeClr val="tx1"/>
+        </a:solidFill>
+        <a:latin typeface="+mn-lt"/>
+        <a:ea typeface="+mn-ea"/>
+        <a:cs typeface="+mn-cs"/>
+      </a:defRPr>
+    </a:lvl8pPr>
+    <a:lvl9pPr marL="3657600" algn="l" defTabSz="914400" rtl="0" eaLnBrk="1" latinLnBrk="0" hangingPunct="1">
+      <a:defRPr sz="1200" kern="1200">
+        <a:solidFill>
+          <a:schemeClr val="tx1"/>
+        </a:solidFill>
+        <a:latin typeface="+mn-lt"/>
+        <a:ea typeface="+mn-ea"/>
+        <a:cs typeface="+mn-cs"/>
+      </a:defRPr>
+    </a:lvl9pPr>
+  </p:notesStyle>
+</p:notesMaster>
+</file>
+
+<file path=ppt/notesSlides/notesSlide1.xml><?xml version="1.0" encoding="utf-8"?>
+<p:notes xmlns:a="http://schemas.openxmlformats.org/drawingml/2006/main" xmlns:r="http://schemas.openxmlformats.org/officeDocument/2006/relationships" xmlns:p="http://schemas.openxmlformats.org/presentationml/2006/main">
+  <p:cSld>
+    <p:spTree>
+      <p:nvGrpSpPr>
+        <p:cNvPr id="1" name=""/>
+        <p:cNvGrpSpPr/>
+        <p:nvPr/>
+      </p:nvGrpSpPr>
+      <p:grpSpPr/>
+      <p:sp>
+        <p:nvSpPr>
+          <p:cNvPr id="2" name="Slide Image Placeholder 1"/>
+          <p:cNvSpPr/>
+          <p:nvPr>
+            <p:ph type="sldImg" idx="2"/>
+          </p:nvPr>
+        </p:nvSpPr>
+        <p:spPr/>
+      </p:sp>
+      <p:sp>
+        <p:nvSpPr>
+          <p:cNvPr id="3" name="Text Placeholder 2"/>
+          <p:cNvSpPr/>
+          <p:nvPr>
+            <p:ph type="body" idx="3"/>
+          </p:nvPr>
+        </p:nvSpPr>
+        <p:spPr/>
+        <p:txBody>
+          <a:bodyPr/>
+          <a:p>
+            <a:endParaRPr lang="en-US"/>
+          </a:p>
+        </p:txBody>
+      </p:sp>
+    </p:spTree>
+  </p:cSld>
+  <p:clrMapOvr>
+    <a:masterClrMapping/>
+  </p:clrMapOvr>
+</p:notes>
+</file>
+
 <file path=ppt/slideLayouts/slideLayout1.xml><?xml version="1.0" encoding="utf-8"?>
 <p:sldLayout xmlns:a="http://schemas.openxmlformats.org/drawingml/2006/main" xmlns:r="http://schemas.openxmlformats.org/officeDocument/2006/relationships" xmlns:p="http://schemas.openxmlformats.org/presentationml/2006/main" type="title" preserve="1">
   <p:cSld name="Title Slide">
@@ -2753,16 +3148,6 @@
           <a:p>
             <a:pPr algn="ctr"/>
             <a:r>
-              <a:rPr lang="" altLang="en-US" sz="4400" b="1">
-                <a:solidFill>
-                  <a:schemeClr val="bg1"/>
-                </a:solidFill>
-                <a:latin typeface="Gubbi" panose="00000400000000000000" charset="0"/>
-                <a:cs typeface="Gubbi" panose="00000400000000000000" charset="0"/>
-              </a:rPr>
-              <a:t>s</a:t>
-            </a:r>
-            <a:r>
               <a:rPr lang="en-US" altLang="en-US" sz="4400" b="1">
                 <a:solidFill>
                   <a:schemeClr val="bg1"/>
@@ -2770,19 +3155,9 @@
                 <a:latin typeface="Gubbi" panose="00000400000000000000" charset="0"/>
                 <a:cs typeface="Gubbi" panose="00000400000000000000" charset="0"/>
               </a:rPr>
-              <a:t>craping </a:t>
-            </a:r>
-            <a:r>
-              <a:rPr lang="" altLang="en-US" sz="4400" b="1">
-                <a:solidFill>
-                  <a:schemeClr val="bg1"/>
-                </a:solidFill>
-                <a:latin typeface="Gubbi" panose="00000400000000000000" charset="0"/>
-                <a:cs typeface="Gubbi" panose="00000400000000000000" charset="0"/>
-              </a:rPr>
-              <a:t>| etl | eda | ml | deploy</a:t>
-            </a:r>
-            <a:endParaRPr lang="" altLang="en-US" sz="4400" b="1">
+              <a:t>scraping | etl | eda | ml | deploy</a:t>
+            </a:r>
+            <a:endParaRPr lang="en-US" altLang="en-US" sz="4400" b="1">
               <a:solidFill>
                 <a:schemeClr val="bg1"/>
               </a:solidFill>
@@ -3285,7 +3660,7 @@
         </p:blipFill>
         <p:spPr>
           <a:xfrm>
-            <a:off x="1284605" y="118110"/>
+            <a:off x="1234440" y="118110"/>
             <a:ext cx="9723755" cy="6622415"/>
           </a:xfrm>
           <a:prstGeom prst="rect">
@@ -3293,6 +3668,1593 @@
           </a:prstGeom>
         </p:spPr>
       </p:pic>
+    </p:spTree>
+  </p:cSld>
+  <p:clrMapOvr>
+    <a:masterClrMapping/>
+  </p:clrMapOvr>
+</p:sld>
+</file>
+
+<file path=ppt/slides/slide4.xml><?xml version="1.0" encoding="utf-8"?>
+<p:sld xmlns:a="http://schemas.openxmlformats.org/drawingml/2006/main" xmlns:r="http://schemas.openxmlformats.org/officeDocument/2006/relationships" xmlns:p="http://schemas.openxmlformats.org/presentationml/2006/main">
+  <p:cSld>
+    <p:spTree>
+      <p:nvGrpSpPr>
+        <p:cNvPr id="1" name=""/>
+        <p:cNvGrpSpPr/>
+        <p:nvPr/>
+      </p:nvGrpSpPr>
+      <p:grpSpPr/>
+      <p:pic>
+        <p:nvPicPr>
+          <p:cNvPr id="4" name="Picture 3" descr="Screenshot from 2020-07-06 10-59-09"/>
+          <p:cNvPicPr>
+            <a:picLocks noChangeAspect="1"/>
+          </p:cNvPicPr>
+          <p:nvPr/>
+        </p:nvPicPr>
+        <p:blipFill>
+          <a:blip r:embed="rId1"/>
+          <a:srcRect r="43931"/>
+          <a:stretch>
+            <a:fillRect/>
+          </a:stretch>
+        </p:blipFill>
+        <p:spPr>
+          <a:xfrm>
+            <a:off x="1007110" y="158115"/>
+            <a:ext cx="8627745" cy="3134995"/>
+          </a:xfrm>
+          <a:prstGeom prst="rect">
+            <a:avLst/>
+          </a:prstGeom>
+        </p:spPr>
+      </p:pic>
+      <p:pic>
+        <p:nvPicPr>
+          <p:cNvPr id="5" name="Picture 4" descr="Screenshot from 2020-07-06 10-59-09"/>
+          <p:cNvPicPr>
+            <a:picLocks noChangeAspect="1"/>
+          </p:cNvPicPr>
+          <p:nvPr/>
+        </p:nvPicPr>
+        <p:blipFill>
+          <a:blip r:embed="rId1"/>
+          <a:srcRect l="55434"/>
+          <a:stretch>
+            <a:fillRect/>
+          </a:stretch>
+        </p:blipFill>
+        <p:spPr>
+          <a:xfrm>
+            <a:off x="2331085" y="3446780"/>
+            <a:ext cx="7089775" cy="3241040"/>
+          </a:xfrm>
+          <a:prstGeom prst="rect">
+            <a:avLst/>
+          </a:prstGeom>
+        </p:spPr>
+      </p:pic>
+      <p:cxnSp>
+        <p:nvCxnSpPr>
+          <p:cNvPr id="6" name="Straight Connector 5"/>
+          <p:cNvCxnSpPr/>
+          <p:nvPr/>
+        </p:nvCxnSpPr>
+        <p:spPr>
+          <a:xfrm>
+            <a:off x="4468495" y="1362075"/>
+            <a:ext cx="128905" cy="0"/>
+          </a:xfrm>
+          <a:prstGeom prst="line">
+            <a:avLst/>
+          </a:prstGeom>
+          <a:ln w="28575">
+            <a:solidFill>
+              <a:srgbClr val="C00000"/>
+            </a:solidFill>
+          </a:ln>
+        </p:spPr>
+        <p:style>
+          <a:lnRef idx="3">
+            <a:schemeClr val="accent2"/>
+          </a:lnRef>
+          <a:fillRef idx="0">
+            <a:schemeClr val="accent2"/>
+          </a:fillRef>
+          <a:effectRef idx="2">
+            <a:schemeClr val="accent2"/>
+          </a:effectRef>
+          <a:fontRef idx="minor">
+            <a:schemeClr val="tx1"/>
+          </a:fontRef>
+        </p:style>
+      </p:cxnSp>
+      <p:cxnSp>
+        <p:nvCxnSpPr>
+          <p:cNvPr id="7" name="Straight Connector 6"/>
+          <p:cNvCxnSpPr/>
+          <p:nvPr/>
+        </p:nvCxnSpPr>
+        <p:spPr>
+          <a:xfrm>
+            <a:off x="5328920" y="1660525"/>
+            <a:ext cx="182880" cy="0"/>
+          </a:xfrm>
+          <a:prstGeom prst="line">
+            <a:avLst/>
+          </a:prstGeom>
+          <a:ln w="28575">
+            <a:solidFill>
+              <a:srgbClr val="C00000"/>
+            </a:solidFill>
+          </a:ln>
+        </p:spPr>
+        <p:style>
+          <a:lnRef idx="3">
+            <a:schemeClr val="accent2"/>
+          </a:lnRef>
+          <a:fillRef idx="0">
+            <a:schemeClr val="accent2"/>
+          </a:fillRef>
+          <a:effectRef idx="2">
+            <a:schemeClr val="accent2"/>
+          </a:effectRef>
+          <a:fontRef idx="minor">
+            <a:schemeClr val="tx1"/>
+          </a:fontRef>
+        </p:style>
+      </p:cxnSp>
+      <p:cxnSp>
+        <p:nvCxnSpPr>
+          <p:cNvPr id="8" name="Straight Connector 7"/>
+          <p:cNvCxnSpPr/>
+          <p:nvPr/>
+        </p:nvCxnSpPr>
+        <p:spPr>
+          <a:xfrm>
+            <a:off x="2810510" y="4695825"/>
+            <a:ext cx="182880" cy="0"/>
+          </a:xfrm>
+          <a:prstGeom prst="line">
+            <a:avLst/>
+          </a:prstGeom>
+          <a:ln w="28575">
+            <a:solidFill>
+              <a:srgbClr val="C00000"/>
+            </a:solidFill>
+          </a:ln>
+        </p:spPr>
+        <p:style>
+          <a:lnRef idx="3">
+            <a:schemeClr val="accent2"/>
+          </a:lnRef>
+          <a:fillRef idx="0">
+            <a:schemeClr val="accent2"/>
+          </a:fillRef>
+          <a:effectRef idx="2">
+            <a:schemeClr val="accent2"/>
+          </a:effectRef>
+          <a:fontRef idx="minor">
+            <a:schemeClr val="tx1"/>
+          </a:fontRef>
+        </p:style>
+      </p:cxnSp>
+      <p:cxnSp>
+        <p:nvCxnSpPr>
+          <p:cNvPr id="9" name="Straight Connector 8"/>
+          <p:cNvCxnSpPr/>
+          <p:nvPr/>
+        </p:nvCxnSpPr>
+        <p:spPr>
+          <a:xfrm>
+            <a:off x="4043045" y="4994275"/>
+            <a:ext cx="182880" cy="0"/>
+          </a:xfrm>
+          <a:prstGeom prst="line">
+            <a:avLst/>
+          </a:prstGeom>
+          <a:ln w="28575">
+            <a:solidFill>
+              <a:srgbClr val="C00000"/>
+            </a:solidFill>
+          </a:ln>
+        </p:spPr>
+        <p:style>
+          <a:lnRef idx="3">
+            <a:schemeClr val="accent2"/>
+          </a:lnRef>
+          <a:fillRef idx="0">
+            <a:schemeClr val="accent2"/>
+          </a:fillRef>
+          <a:effectRef idx="2">
+            <a:schemeClr val="accent2"/>
+          </a:effectRef>
+          <a:fontRef idx="minor">
+            <a:schemeClr val="tx1"/>
+          </a:fontRef>
+        </p:style>
+      </p:cxnSp>
+      <p:cxnSp>
+        <p:nvCxnSpPr>
+          <p:cNvPr id="10" name="Straight Connector 9"/>
+          <p:cNvCxnSpPr/>
+          <p:nvPr/>
+        </p:nvCxnSpPr>
+        <p:spPr>
+          <a:xfrm>
+            <a:off x="4522470" y="4686300"/>
+            <a:ext cx="182880" cy="0"/>
+          </a:xfrm>
+          <a:prstGeom prst="line">
+            <a:avLst/>
+          </a:prstGeom>
+          <a:ln w="28575">
+            <a:solidFill>
+              <a:srgbClr val="C00000"/>
+            </a:solidFill>
+          </a:ln>
+        </p:spPr>
+        <p:style>
+          <a:lnRef idx="3">
+            <a:schemeClr val="accent2"/>
+          </a:lnRef>
+          <a:fillRef idx="0">
+            <a:schemeClr val="accent2"/>
+          </a:fillRef>
+          <a:effectRef idx="2">
+            <a:schemeClr val="accent2"/>
+          </a:effectRef>
+          <a:fontRef idx="minor">
+            <a:schemeClr val="tx1"/>
+          </a:fontRef>
+        </p:style>
+      </p:cxnSp>
+      <p:cxnSp>
+        <p:nvCxnSpPr>
+          <p:cNvPr id="11" name="Straight Connector 10"/>
+          <p:cNvCxnSpPr/>
+          <p:nvPr/>
+        </p:nvCxnSpPr>
+        <p:spPr>
+          <a:xfrm>
+            <a:off x="4944745" y="4686300"/>
+            <a:ext cx="182880" cy="0"/>
+          </a:xfrm>
+          <a:prstGeom prst="line">
+            <a:avLst/>
+          </a:prstGeom>
+          <a:ln w="28575">
+            <a:solidFill>
+              <a:srgbClr val="C00000"/>
+            </a:solidFill>
+          </a:ln>
+        </p:spPr>
+        <p:style>
+          <a:lnRef idx="3">
+            <a:schemeClr val="accent2"/>
+          </a:lnRef>
+          <a:fillRef idx="0">
+            <a:schemeClr val="accent2"/>
+          </a:fillRef>
+          <a:effectRef idx="2">
+            <a:schemeClr val="accent2"/>
+          </a:effectRef>
+          <a:fontRef idx="minor">
+            <a:schemeClr val="tx1"/>
+          </a:fontRef>
+        </p:style>
+      </p:cxnSp>
+      <p:cxnSp>
+        <p:nvCxnSpPr>
+          <p:cNvPr id="12" name="Straight Connector 11"/>
+          <p:cNvCxnSpPr/>
+          <p:nvPr/>
+        </p:nvCxnSpPr>
+        <p:spPr>
+          <a:xfrm>
+            <a:off x="4522470" y="4832350"/>
+            <a:ext cx="519430" cy="0"/>
+          </a:xfrm>
+          <a:prstGeom prst="line">
+            <a:avLst/>
+          </a:prstGeom>
+          <a:ln w="28575">
+            <a:solidFill>
+              <a:srgbClr val="C00000"/>
+            </a:solidFill>
+          </a:ln>
+        </p:spPr>
+        <p:style>
+          <a:lnRef idx="3">
+            <a:schemeClr val="accent2"/>
+          </a:lnRef>
+          <a:fillRef idx="0">
+            <a:schemeClr val="accent2"/>
+          </a:fillRef>
+          <a:effectRef idx="2">
+            <a:schemeClr val="accent2"/>
+          </a:effectRef>
+          <a:fontRef idx="minor">
+            <a:schemeClr val="tx1"/>
+          </a:fontRef>
+        </p:style>
+      </p:cxnSp>
+      <p:cxnSp>
+        <p:nvCxnSpPr>
+          <p:cNvPr id="13" name="Straight Connector 12"/>
+          <p:cNvCxnSpPr/>
+          <p:nvPr/>
+        </p:nvCxnSpPr>
+        <p:spPr>
+          <a:xfrm>
+            <a:off x="4670425" y="4986655"/>
+            <a:ext cx="431800" cy="1270"/>
+          </a:xfrm>
+          <a:prstGeom prst="line">
+            <a:avLst/>
+          </a:prstGeom>
+          <a:ln w="28575">
+            <a:solidFill>
+              <a:srgbClr val="C00000"/>
+            </a:solidFill>
+          </a:ln>
+        </p:spPr>
+        <p:style>
+          <a:lnRef idx="3">
+            <a:schemeClr val="accent2"/>
+          </a:lnRef>
+          <a:fillRef idx="0">
+            <a:schemeClr val="accent2"/>
+          </a:fillRef>
+          <a:effectRef idx="2">
+            <a:schemeClr val="accent2"/>
+          </a:effectRef>
+          <a:fontRef idx="minor">
+            <a:schemeClr val="tx1"/>
+          </a:fontRef>
+        </p:style>
+      </p:cxnSp>
+      <p:cxnSp>
+        <p:nvCxnSpPr>
+          <p:cNvPr id="15" name="Straight Connector 14"/>
+          <p:cNvCxnSpPr/>
+          <p:nvPr/>
+        </p:nvCxnSpPr>
+        <p:spPr>
+          <a:xfrm>
+            <a:off x="2994660" y="4689475"/>
+            <a:ext cx="1228090" cy="0"/>
+          </a:xfrm>
+          <a:prstGeom prst="line">
+            <a:avLst/>
+          </a:prstGeom>
+          <a:ln w="28575">
+            <a:solidFill>
+              <a:srgbClr val="00B0F0"/>
+            </a:solidFill>
+          </a:ln>
+        </p:spPr>
+        <p:style>
+          <a:lnRef idx="3">
+            <a:schemeClr val="accent2"/>
+          </a:lnRef>
+          <a:fillRef idx="0">
+            <a:schemeClr val="accent2"/>
+          </a:fillRef>
+          <a:effectRef idx="2">
+            <a:schemeClr val="accent2"/>
+          </a:effectRef>
+          <a:fontRef idx="minor">
+            <a:schemeClr val="tx1"/>
+          </a:fontRef>
+        </p:style>
+      </p:cxnSp>
+      <p:cxnSp>
+        <p:nvCxnSpPr>
+          <p:cNvPr id="16" name="Straight Connector 15"/>
+          <p:cNvCxnSpPr/>
+          <p:nvPr/>
+        </p:nvCxnSpPr>
+        <p:spPr>
+          <a:xfrm>
+            <a:off x="2854960" y="4832350"/>
+            <a:ext cx="1358265" cy="0"/>
+          </a:xfrm>
+          <a:prstGeom prst="line">
+            <a:avLst/>
+          </a:prstGeom>
+          <a:ln w="28575">
+            <a:solidFill>
+              <a:srgbClr val="00B0F0"/>
+            </a:solidFill>
+          </a:ln>
+        </p:spPr>
+        <p:style>
+          <a:lnRef idx="3">
+            <a:schemeClr val="accent2"/>
+          </a:lnRef>
+          <a:fillRef idx="0">
+            <a:schemeClr val="accent2"/>
+          </a:fillRef>
+          <a:effectRef idx="2">
+            <a:schemeClr val="accent2"/>
+          </a:effectRef>
+          <a:fontRef idx="minor">
+            <a:schemeClr val="tx1"/>
+          </a:fontRef>
+        </p:style>
+      </p:cxnSp>
+      <p:cxnSp>
+        <p:nvCxnSpPr>
+          <p:cNvPr id="17" name="Straight Connector 16"/>
+          <p:cNvCxnSpPr/>
+          <p:nvPr/>
+        </p:nvCxnSpPr>
+        <p:spPr>
+          <a:xfrm>
+            <a:off x="3003550" y="4994275"/>
+            <a:ext cx="1058545" cy="0"/>
+          </a:xfrm>
+          <a:prstGeom prst="line">
+            <a:avLst/>
+          </a:prstGeom>
+          <a:ln w="28575">
+            <a:solidFill>
+              <a:srgbClr val="00B0F0"/>
+            </a:solidFill>
+          </a:ln>
+        </p:spPr>
+        <p:style>
+          <a:lnRef idx="3">
+            <a:schemeClr val="accent2"/>
+          </a:lnRef>
+          <a:fillRef idx="0">
+            <a:schemeClr val="accent2"/>
+          </a:fillRef>
+          <a:effectRef idx="2">
+            <a:schemeClr val="accent2"/>
+          </a:effectRef>
+          <a:fontRef idx="minor">
+            <a:schemeClr val="tx1"/>
+          </a:fontRef>
+        </p:style>
+      </p:cxnSp>
+      <p:cxnSp>
+        <p:nvCxnSpPr>
+          <p:cNvPr id="18" name="Straight Connector 17"/>
+          <p:cNvCxnSpPr/>
+          <p:nvPr/>
+        </p:nvCxnSpPr>
+        <p:spPr>
+          <a:xfrm>
+            <a:off x="4705350" y="4686300"/>
+            <a:ext cx="241300" cy="0"/>
+          </a:xfrm>
+          <a:prstGeom prst="line">
+            <a:avLst/>
+          </a:prstGeom>
+          <a:ln w="28575">
+            <a:solidFill>
+              <a:srgbClr val="00B0F0"/>
+            </a:solidFill>
+          </a:ln>
+        </p:spPr>
+        <p:style>
+          <a:lnRef idx="3">
+            <a:schemeClr val="accent2"/>
+          </a:lnRef>
+          <a:fillRef idx="0">
+            <a:schemeClr val="accent2"/>
+          </a:fillRef>
+          <a:effectRef idx="2">
+            <a:schemeClr val="accent2"/>
+          </a:effectRef>
+          <a:fontRef idx="minor">
+            <a:schemeClr val="tx1"/>
+          </a:fontRef>
+        </p:style>
+      </p:cxnSp>
+      <p:cxnSp>
+        <p:nvCxnSpPr>
+          <p:cNvPr id="19" name="Straight Connector 18"/>
+          <p:cNvCxnSpPr/>
+          <p:nvPr/>
+        </p:nvCxnSpPr>
+        <p:spPr>
+          <a:xfrm>
+            <a:off x="5603875" y="4603750"/>
+            <a:ext cx="121920" cy="0"/>
+          </a:xfrm>
+          <a:prstGeom prst="line">
+            <a:avLst/>
+          </a:prstGeom>
+          <a:ln w="28575">
+            <a:solidFill>
+              <a:srgbClr val="00B0F0"/>
+            </a:solidFill>
+          </a:ln>
+        </p:spPr>
+        <p:style>
+          <a:lnRef idx="3">
+            <a:schemeClr val="accent2"/>
+          </a:lnRef>
+          <a:fillRef idx="0">
+            <a:schemeClr val="accent2"/>
+          </a:fillRef>
+          <a:effectRef idx="2">
+            <a:schemeClr val="accent2"/>
+          </a:effectRef>
+          <a:fontRef idx="minor">
+            <a:schemeClr val="tx1"/>
+          </a:fontRef>
+        </p:style>
+      </p:cxnSp>
+      <p:cxnSp>
+        <p:nvCxnSpPr>
+          <p:cNvPr id="20" name="Straight Connector 19"/>
+          <p:cNvCxnSpPr/>
+          <p:nvPr/>
+        </p:nvCxnSpPr>
+        <p:spPr>
+          <a:xfrm>
+            <a:off x="5411470" y="4603750"/>
+            <a:ext cx="182880" cy="0"/>
+          </a:xfrm>
+          <a:prstGeom prst="line">
+            <a:avLst/>
+          </a:prstGeom>
+          <a:ln w="28575">
+            <a:solidFill>
+              <a:srgbClr val="C00000"/>
+            </a:solidFill>
+          </a:ln>
+        </p:spPr>
+        <p:style>
+          <a:lnRef idx="3">
+            <a:schemeClr val="accent2"/>
+          </a:lnRef>
+          <a:fillRef idx="0">
+            <a:schemeClr val="accent2"/>
+          </a:fillRef>
+          <a:effectRef idx="2">
+            <a:schemeClr val="accent2"/>
+          </a:effectRef>
+          <a:fontRef idx="minor">
+            <a:schemeClr val="tx1"/>
+          </a:fontRef>
+        </p:style>
+      </p:cxnSp>
+      <p:cxnSp>
+        <p:nvCxnSpPr>
+          <p:cNvPr id="21" name="Straight Connector 20"/>
+          <p:cNvCxnSpPr/>
+          <p:nvPr/>
+        </p:nvCxnSpPr>
+        <p:spPr>
+          <a:xfrm>
+            <a:off x="5626100" y="4759325"/>
+            <a:ext cx="182880" cy="0"/>
+          </a:xfrm>
+          <a:prstGeom prst="line">
+            <a:avLst/>
+          </a:prstGeom>
+          <a:ln w="28575">
+            <a:solidFill>
+              <a:srgbClr val="C00000"/>
+            </a:solidFill>
+          </a:ln>
+        </p:spPr>
+        <p:style>
+          <a:lnRef idx="3">
+            <a:schemeClr val="accent2"/>
+          </a:lnRef>
+          <a:fillRef idx="0">
+            <a:schemeClr val="accent2"/>
+          </a:fillRef>
+          <a:effectRef idx="2">
+            <a:schemeClr val="accent2"/>
+          </a:effectRef>
+          <a:fontRef idx="minor">
+            <a:schemeClr val="tx1"/>
+          </a:fontRef>
+        </p:style>
+      </p:cxnSp>
+      <p:cxnSp>
+        <p:nvCxnSpPr>
+          <p:cNvPr id="22" name="Straight Connector 21"/>
+          <p:cNvCxnSpPr/>
+          <p:nvPr/>
+        </p:nvCxnSpPr>
+        <p:spPr>
+          <a:xfrm>
+            <a:off x="5241925" y="4914900"/>
+            <a:ext cx="581025" cy="0"/>
+          </a:xfrm>
+          <a:prstGeom prst="line">
+            <a:avLst/>
+          </a:prstGeom>
+          <a:ln w="28575">
+            <a:solidFill>
+              <a:srgbClr val="C00000"/>
+            </a:solidFill>
+          </a:ln>
+        </p:spPr>
+        <p:style>
+          <a:lnRef idx="3">
+            <a:schemeClr val="accent2"/>
+          </a:lnRef>
+          <a:fillRef idx="0">
+            <a:schemeClr val="accent2"/>
+          </a:fillRef>
+          <a:effectRef idx="2">
+            <a:schemeClr val="accent2"/>
+          </a:effectRef>
+          <a:fontRef idx="minor">
+            <a:schemeClr val="tx1"/>
+          </a:fontRef>
+        </p:style>
+      </p:cxnSp>
+      <p:cxnSp>
+        <p:nvCxnSpPr>
+          <p:cNvPr id="23" name="Straight Connector 22"/>
+          <p:cNvCxnSpPr/>
+          <p:nvPr/>
+        </p:nvCxnSpPr>
+        <p:spPr>
+          <a:xfrm>
+            <a:off x="5725795" y="4603750"/>
+            <a:ext cx="100330" cy="0"/>
+          </a:xfrm>
+          <a:prstGeom prst="line">
+            <a:avLst/>
+          </a:prstGeom>
+          <a:ln w="28575">
+            <a:solidFill>
+              <a:srgbClr val="C00000"/>
+            </a:solidFill>
+          </a:ln>
+        </p:spPr>
+        <p:style>
+          <a:lnRef idx="3">
+            <a:schemeClr val="accent2"/>
+          </a:lnRef>
+          <a:fillRef idx="0">
+            <a:schemeClr val="accent2"/>
+          </a:fillRef>
+          <a:effectRef idx="2">
+            <a:schemeClr val="accent2"/>
+          </a:effectRef>
+          <a:fontRef idx="minor">
+            <a:schemeClr val="tx1"/>
+          </a:fontRef>
+        </p:style>
+      </p:cxnSp>
+      <p:cxnSp>
+        <p:nvCxnSpPr>
+          <p:cNvPr id="24" name="Straight Connector 23"/>
+          <p:cNvCxnSpPr/>
+          <p:nvPr/>
+        </p:nvCxnSpPr>
+        <p:spPr>
+          <a:xfrm>
+            <a:off x="5724525" y="5057775"/>
+            <a:ext cx="88900" cy="0"/>
+          </a:xfrm>
+          <a:prstGeom prst="line">
+            <a:avLst/>
+          </a:prstGeom>
+          <a:ln w="28575">
+            <a:solidFill>
+              <a:srgbClr val="C00000"/>
+            </a:solidFill>
+          </a:ln>
+        </p:spPr>
+        <p:style>
+          <a:lnRef idx="3">
+            <a:schemeClr val="accent2"/>
+          </a:lnRef>
+          <a:fillRef idx="0">
+            <a:schemeClr val="accent2"/>
+          </a:fillRef>
+          <a:effectRef idx="2">
+            <a:schemeClr val="accent2"/>
+          </a:effectRef>
+          <a:fontRef idx="minor">
+            <a:schemeClr val="tx1"/>
+          </a:fontRef>
+        </p:style>
+      </p:cxnSp>
+      <p:cxnSp>
+        <p:nvCxnSpPr>
+          <p:cNvPr id="25" name="Straight Connector 24"/>
+          <p:cNvCxnSpPr/>
+          <p:nvPr/>
+        </p:nvCxnSpPr>
+        <p:spPr>
+          <a:xfrm>
+            <a:off x="5970270" y="4986655"/>
+            <a:ext cx="581025" cy="0"/>
+          </a:xfrm>
+          <a:prstGeom prst="line">
+            <a:avLst/>
+          </a:prstGeom>
+          <a:ln w="28575">
+            <a:solidFill>
+              <a:srgbClr val="C00000"/>
+            </a:solidFill>
+          </a:ln>
+        </p:spPr>
+        <p:style>
+          <a:lnRef idx="3">
+            <a:schemeClr val="accent2"/>
+          </a:lnRef>
+          <a:fillRef idx="0">
+            <a:schemeClr val="accent2"/>
+          </a:fillRef>
+          <a:effectRef idx="2">
+            <a:schemeClr val="accent2"/>
+          </a:effectRef>
+          <a:fontRef idx="minor">
+            <a:schemeClr val="tx1"/>
+          </a:fontRef>
+        </p:style>
+      </p:cxnSp>
+      <p:cxnSp>
+        <p:nvCxnSpPr>
+          <p:cNvPr id="26" name="Straight Connector 25"/>
+          <p:cNvCxnSpPr/>
+          <p:nvPr/>
+        </p:nvCxnSpPr>
+        <p:spPr>
+          <a:xfrm>
+            <a:off x="6358890" y="4832350"/>
+            <a:ext cx="182880" cy="0"/>
+          </a:xfrm>
+          <a:prstGeom prst="line">
+            <a:avLst/>
+          </a:prstGeom>
+          <a:ln w="28575">
+            <a:solidFill>
+              <a:srgbClr val="C00000"/>
+            </a:solidFill>
+          </a:ln>
+        </p:spPr>
+        <p:style>
+          <a:lnRef idx="3">
+            <a:schemeClr val="accent2"/>
+          </a:lnRef>
+          <a:fillRef idx="0">
+            <a:schemeClr val="accent2"/>
+          </a:fillRef>
+          <a:effectRef idx="2">
+            <a:schemeClr val="accent2"/>
+          </a:effectRef>
+          <a:fontRef idx="minor">
+            <a:schemeClr val="tx1"/>
+          </a:fontRef>
+        </p:style>
+      </p:cxnSp>
+      <p:cxnSp>
+        <p:nvCxnSpPr>
+          <p:cNvPr id="27" name="Straight Connector 26"/>
+          <p:cNvCxnSpPr/>
+          <p:nvPr/>
+        </p:nvCxnSpPr>
+        <p:spPr>
+          <a:xfrm>
+            <a:off x="6159500" y="4679950"/>
+            <a:ext cx="182880" cy="0"/>
+          </a:xfrm>
+          <a:prstGeom prst="line">
+            <a:avLst/>
+          </a:prstGeom>
+          <a:ln w="28575">
+            <a:solidFill>
+              <a:srgbClr val="C00000"/>
+            </a:solidFill>
+          </a:ln>
+        </p:spPr>
+        <p:style>
+          <a:lnRef idx="3">
+            <a:schemeClr val="accent2"/>
+          </a:lnRef>
+          <a:fillRef idx="0">
+            <a:schemeClr val="accent2"/>
+          </a:fillRef>
+          <a:effectRef idx="2">
+            <a:schemeClr val="accent2"/>
+          </a:effectRef>
+          <a:fontRef idx="minor">
+            <a:schemeClr val="tx1"/>
+          </a:fontRef>
+        </p:style>
+      </p:cxnSp>
+      <p:cxnSp>
+        <p:nvCxnSpPr>
+          <p:cNvPr id="28" name="Straight Connector 27"/>
+          <p:cNvCxnSpPr/>
+          <p:nvPr/>
+        </p:nvCxnSpPr>
+        <p:spPr>
+          <a:xfrm>
+            <a:off x="6340475" y="4683125"/>
+            <a:ext cx="121920" cy="0"/>
+          </a:xfrm>
+          <a:prstGeom prst="line">
+            <a:avLst/>
+          </a:prstGeom>
+          <a:ln w="28575">
+            <a:solidFill>
+              <a:srgbClr val="00B0F0"/>
+            </a:solidFill>
+          </a:ln>
+        </p:spPr>
+        <p:style>
+          <a:lnRef idx="3">
+            <a:schemeClr val="accent2"/>
+          </a:lnRef>
+          <a:fillRef idx="0">
+            <a:schemeClr val="accent2"/>
+          </a:fillRef>
+          <a:effectRef idx="2">
+            <a:schemeClr val="accent2"/>
+          </a:effectRef>
+          <a:fontRef idx="minor">
+            <a:schemeClr val="tx1"/>
+          </a:fontRef>
+        </p:style>
+      </p:cxnSp>
+      <p:cxnSp>
+        <p:nvCxnSpPr>
+          <p:cNvPr id="29" name="Straight Connector 28"/>
+          <p:cNvCxnSpPr/>
+          <p:nvPr/>
+        </p:nvCxnSpPr>
+        <p:spPr>
+          <a:xfrm>
+            <a:off x="6462395" y="4683125"/>
+            <a:ext cx="100330" cy="0"/>
+          </a:xfrm>
+          <a:prstGeom prst="line">
+            <a:avLst/>
+          </a:prstGeom>
+          <a:ln w="28575">
+            <a:solidFill>
+              <a:srgbClr val="C00000"/>
+            </a:solidFill>
+          </a:ln>
+        </p:spPr>
+        <p:style>
+          <a:lnRef idx="3">
+            <a:schemeClr val="accent2"/>
+          </a:lnRef>
+          <a:fillRef idx="0">
+            <a:schemeClr val="accent2"/>
+          </a:fillRef>
+          <a:effectRef idx="2">
+            <a:schemeClr val="accent2"/>
+          </a:effectRef>
+          <a:fontRef idx="minor">
+            <a:schemeClr val="tx1"/>
+          </a:fontRef>
+        </p:style>
+      </p:cxnSp>
+      <p:cxnSp>
+        <p:nvCxnSpPr>
+          <p:cNvPr id="30" name="Straight Connector 29"/>
+          <p:cNvCxnSpPr/>
+          <p:nvPr/>
+        </p:nvCxnSpPr>
+        <p:spPr>
+          <a:xfrm>
+            <a:off x="6878320" y="4759325"/>
+            <a:ext cx="478155" cy="0"/>
+          </a:xfrm>
+          <a:prstGeom prst="line">
+            <a:avLst/>
+          </a:prstGeom>
+          <a:ln w="28575">
+            <a:solidFill>
+              <a:srgbClr val="C00000"/>
+            </a:solidFill>
+          </a:ln>
+        </p:spPr>
+        <p:style>
+          <a:lnRef idx="3">
+            <a:schemeClr val="accent2"/>
+          </a:lnRef>
+          <a:fillRef idx="0">
+            <a:schemeClr val="accent2"/>
+          </a:fillRef>
+          <a:effectRef idx="2">
+            <a:schemeClr val="accent2"/>
+          </a:effectRef>
+          <a:fontRef idx="minor">
+            <a:schemeClr val="tx1"/>
+          </a:fontRef>
+        </p:style>
+      </p:cxnSp>
+      <p:cxnSp>
+        <p:nvCxnSpPr>
+          <p:cNvPr id="31" name="Straight Connector 30"/>
+          <p:cNvCxnSpPr/>
+          <p:nvPr/>
+        </p:nvCxnSpPr>
+        <p:spPr>
+          <a:xfrm>
+            <a:off x="6686550" y="4914900"/>
+            <a:ext cx="527050" cy="0"/>
+          </a:xfrm>
+          <a:prstGeom prst="line">
+            <a:avLst/>
+          </a:prstGeom>
+          <a:ln w="28575">
+            <a:solidFill>
+              <a:srgbClr val="00B0F0"/>
+            </a:solidFill>
+          </a:ln>
+        </p:spPr>
+        <p:style>
+          <a:lnRef idx="3">
+            <a:schemeClr val="accent2"/>
+          </a:lnRef>
+          <a:fillRef idx="0">
+            <a:schemeClr val="accent2"/>
+          </a:fillRef>
+          <a:effectRef idx="2">
+            <a:schemeClr val="accent2"/>
+          </a:effectRef>
+          <a:fontRef idx="minor">
+            <a:schemeClr val="tx1"/>
+          </a:fontRef>
+        </p:style>
+      </p:cxnSp>
+      <p:cxnSp>
+        <p:nvCxnSpPr>
+          <p:cNvPr id="32" name="Straight Connector 31"/>
+          <p:cNvCxnSpPr/>
+          <p:nvPr/>
+        </p:nvCxnSpPr>
+        <p:spPr>
+          <a:xfrm>
+            <a:off x="7213600" y="4914900"/>
+            <a:ext cx="100330" cy="0"/>
+          </a:xfrm>
+          <a:prstGeom prst="line">
+            <a:avLst/>
+          </a:prstGeom>
+          <a:ln w="28575">
+            <a:solidFill>
+              <a:srgbClr val="C00000"/>
+            </a:solidFill>
+          </a:ln>
+        </p:spPr>
+        <p:style>
+          <a:lnRef idx="3">
+            <a:schemeClr val="accent2"/>
+          </a:lnRef>
+          <a:fillRef idx="0">
+            <a:schemeClr val="accent2"/>
+          </a:fillRef>
+          <a:effectRef idx="2">
+            <a:schemeClr val="accent2"/>
+          </a:effectRef>
+          <a:fontRef idx="minor">
+            <a:schemeClr val="tx1"/>
+          </a:fontRef>
+        </p:style>
+      </p:cxnSp>
+      <p:cxnSp>
+        <p:nvCxnSpPr>
+          <p:cNvPr id="33" name="Straight Connector 32"/>
+          <p:cNvCxnSpPr/>
+          <p:nvPr/>
+        </p:nvCxnSpPr>
+        <p:spPr>
+          <a:xfrm>
+            <a:off x="7705725" y="4686300"/>
+            <a:ext cx="121920" cy="0"/>
+          </a:xfrm>
+          <a:prstGeom prst="line">
+            <a:avLst/>
+          </a:prstGeom>
+          <a:ln w="28575">
+            <a:solidFill>
+              <a:srgbClr val="00B0F0"/>
+            </a:solidFill>
+          </a:ln>
+        </p:spPr>
+        <p:style>
+          <a:lnRef idx="3">
+            <a:schemeClr val="accent2"/>
+          </a:lnRef>
+          <a:fillRef idx="0">
+            <a:schemeClr val="accent2"/>
+          </a:fillRef>
+          <a:effectRef idx="2">
+            <a:schemeClr val="accent2"/>
+          </a:effectRef>
+          <a:fontRef idx="minor">
+            <a:schemeClr val="tx1"/>
+          </a:fontRef>
+        </p:style>
+      </p:cxnSp>
+      <p:cxnSp>
+        <p:nvCxnSpPr>
+          <p:cNvPr id="34" name="Straight Connector 33"/>
+          <p:cNvCxnSpPr/>
+          <p:nvPr/>
+        </p:nvCxnSpPr>
+        <p:spPr>
+          <a:xfrm>
+            <a:off x="7496175" y="4683125"/>
+            <a:ext cx="231775" cy="0"/>
+          </a:xfrm>
+          <a:prstGeom prst="line">
+            <a:avLst/>
+          </a:prstGeom>
+          <a:ln w="28575">
+            <a:solidFill>
+              <a:srgbClr val="C00000"/>
+            </a:solidFill>
+          </a:ln>
+        </p:spPr>
+        <p:style>
+          <a:lnRef idx="3">
+            <a:schemeClr val="accent2"/>
+          </a:lnRef>
+          <a:fillRef idx="0">
+            <a:schemeClr val="accent2"/>
+          </a:fillRef>
+          <a:effectRef idx="2">
+            <a:schemeClr val="accent2"/>
+          </a:effectRef>
+          <a:fontRef idx="minor">
+            <a:schemeClr val="tx1"/>
+          </a:fontRef>
+        </p:style>
+      </p:cxnSp>
+      <p:cxnSp>
+        <p:nvCxnSpPr>
+          <p:cNvPr id="35" name="Straight Connector 34"/>
+          <p:cNvCxnSpPr/>
+          <p:nvPr/>
+        </p:nvCxnSpPr>
+        <p:spPr>
+          <a:xfrm>
+            <a:off x="7832725" y="4686300"/>
+            <a:ext cx="323850" cy="0"/>
+          </a:xfrm>
+          <a:prstGeom prst="line">
+            <a:avLst/>
+          </a:prstGeom>
+          <a:ln w="28575">
+            <a:solidFill>
+              <a:srgbClr val="C00000"/>
+            </a:solidFill>
+          </a:ln>
+        </p:spPr>
+        <p:style>
+          <a:lnRef idx="3">
+            <a:schemeClr val="accent2"/>
+          </a:lnRef>
+          <a:fillRef idx="0">
+            <a:schemeClr val="accent2"/>
+          </a:fillRef>
+          <a:effectRef idx="2">
+            <a:schemeClr val="accent2"/>
+          </a:effectRef>
+          <a:fontRef idx="minor">
+            <a:schemeClr val="tx1"/>
+          </a:fontRef>
+        </p:style>
+      </p:cxnSp>
+      <p:cxnSp>
+        <p:nvCxnSpPr>
+          <p:cNvPr id="36" name="Straight Connector 35"/>
+          <p:cNvCxnSpPr/>
+          <p:nvPr/>
+        </p:nvCxnSpPr>
+        <p:spPr>
+          <a:xfrm>
+            <a:off x="7518400" y="4832350"/>
+            <a:ext cx="657225" cy="0"/>
+          </a:xfrm>
+          <a:prstGeom prst="line">
+            <a:avLst/>
+          </a:prstGeom>
+          <a:ln w="28575">
+            <a:solidFill>
+              <a:srgbClr val="C00000"/>
+            </a:solidFill>
+          </a:ln>
+        </p:spPr>
+        <p:style>
+          <a:lnRef idx="3">
+            <a:schemeClr val="accent2"/>
+          </a:lnRef>
+          <a:fillRef idx="0">
+            <a:schemeClr val="accent2"/>
+          </a:fillRef>
+          <a:effectRef idx="2">
+            <a:schemeClr val="accent2"/>
+          </a:effectRef>
+          <a:fontRef idx="minor">
+            <a:schemeClr val="tx1"/>
+          </a:fontRef>
+        </p:style>
+      </p:cxnSp>
+      <p:cxnSp>
+        <p:nvCxnSpPr>
+          <p:cNvPr id="37" name="Straight Connector 36"/>
+          <p:cNvCxnSpPr/>
+          <p:nvPr/>
+        </p:nvCxnSpPr>
+        <p:spPr>
+          <a:xfrm>
+            <a:off x="8064500" y="4965700"/>
+            <a:ext cx="100330" cy="0"/>
+          </a:xfrm>
+          <a:prstGeom prst="line">
+            <a:avLst/>
+          </a:prstGeom>
+          <a:ln w="28575">
+            <a:solidFill>
+              <a:srgbClr val="C00000"/>
+            </a:solidFill>
+          </a:ln>
+        </p:spPr>
+        <p:style>
+          <a:lnRef idx="3">
+            <a:schemeClr val="accent2"/>
+          </a:lnRef>
+          <a:fillRef idx="0">
+            <a:schemeClr val="accent2"/>
+          </a:fillRef>
+          <a:effectRef idx="2">
+            <a:schemeClr val="accent2"/>
+          </a:effectRef>
+          <a:fontRef idx="minor">
+            <a:schemeClr val="tx1"/>
+          </a:fontRef>
+        </p:style>
+      </p:cxnSp>
+      <p:cxnSp>
+        <p:nvCxnSpPr>
+          <p:cNvPr id="38" name="Straight Connector 37"/>
+          <p:cNvCxnSpPr/>
+          <p:nvPr/>
+        </p:nvCxnSpPr>
+        <p:spPr>
+          <a:xfrm>
+            <a:off x="8790305" y="4765675"/>
+            <a:ext cx="121920" cy="0"/>
+          </a:xfrm>
+          <a:prstGeom prst="line">
+            <a:avLst/>
+          </a:prstGeom>
+          <a:ln w="28575">
+            <a:solidFill>
+              <a:srgbClr val="00B0F0"/>
+            </a:solidFill>
+          </a:ln>
+        </p:spPr>
+        <p:style>
+          <a:lnRef idx="3">
+            <a:schemeClr val="accent2"/>
+          </a:lnRef>
+          <a:fillRef idx="0">
+            <a:schemeClr val="accent2"/>
+          </a:fillRef>
+          <a:effectRef idx="2">
+            <a:schemeClr val="accent2"/>
+          </a:effectRef>
+          <a:fontRef idx="minor">
+            <a:schemeClr val="tx1"/>
+          </a:fontRef>
+        </p:style>
+      </p:cxnSp>
+      <p:cxnSp>
+        <p:nvCxnSpPr>
+          <p:cNvPr id="39" name="Straight Connector 38"/>
+          <p:cNvCxnSpPr/>
+          <p:nvPr/>
+        </p:nvCxnSpPr>
+        <p:spPr>
+          <a:xfrm>
+            <a:off x="8566150" y="4772025"/>
+            <a:ext cx="231775" cy="0"/>
+          </a:xfrm>
+          <a:prstGeom prst="line">
+            <a:avLst/>
+          </a:prstGeom>
+          <a:ln w="28575">
+            <a:solidFill>
+              <a:srgbClr val="C00000"/>
+            </a:solidFill>
+          </a:ln>
+        </p:spPr>
+        <p:style>
+          <a:lnRef idx="3">
+            <a:schemeClr val="accent2"/>
+          </a:lnRef>
+          <a:fillRef idx="0">
+            <a:schemeClr val="accent2"/>
+          </a:fillRef>
+          <a:effectRef idx="2">
+            <a:schemeClr val="accent2"/>
+          </a:effectRef>
+          <a:fontRef idx="minor">
+            <a:schemeClr val="tx1"/>
+          </a:fontRef>
+        </p:style>
+      </p:cxnSp>
+      <p:cxnSp>
+        <p:nvCxnSpPr>
+          <p:cNvPr id="40" name="Straight Connector 39"/>
+          <p:cNvCxnSpPr/>
+          <p:nvPr/>
+        </p:nvCxnSpPr>
+        <p:spPr>
+          <a:xfrm>
+            <a:off x="8902700" y="4765675"/>
+            <a:ext cx="323850" cy="0"/>
+          </a:xfrm>
+          <a:prstGeom prst="line">
+            <a:avLst/>
+          </a:prstGeom>
+          <a:ln w="28575">
+            <a:solidFill>
+              <a:srgbClr val="C00000"/>
+            </a:solidFill>
+          </a:ln>
+        </p:spPr>
+        <p:style>
+          <a:lnRef idx="3">
+            <a:schemeClr val="accent2"/>
+          </a:lnRef>
+          <a:fillRef idx="0">
+            <a:schemeClr val="accent2"/>
+          </a:fillRef>
+          <a:effectRef idx="2">
+            <a:schemeClr val="accent2"/>
+          </a:effectRef>
+          <a:fontRef idx="minor">
+            <a:schemeClr val="tx1"/>
+          </a:fontRef>
+        </p:style>
+      </p:cxnSp>
+      <p:cxnSp>
+        <p:nvCxnSpPr>
+          <p:cNvPr id="41" name="Straight Connector 40"/>
+          <p:cNvCxnSpPr/>
+          <p:nvPr/>
+        </p:nvCxnSpPr>
+        <p:spPr>
+          <a:xfrm>
+            <a:off x="8588375" y="4911725"/>
+            <a:ext cx="657225" cy="0"/>
+          </a:xfrm>
+          <a:prstGeom prst="line">
+            <a:avLst/>
+          </a:prstGeom>
+          <a:ln w="28575">
+            <a:solidFill>
+              <a:srgbClr val="C00000"/>
+            </a:solidFill>
+          </a:ln>
+        </p:spPr>
+        <p:style>
+          <a:lnRef idx="3">
+            <a:schemeClr val="accent2"/>
+          </a:lnRef>
+          <a:fillRef idx="0">
+            <a:schemeClr val="accent2"/>
+          </a:fillRef>
+          <a:effectRef idx="2">
+            <a:schemeClr val="accent2"/>
+          </a:effectRef>
+          <a:fontRef idx="minor">
+            <a:schemeClr val="tx1"/>
+          </a:fontRef>
+        </p:style>
+      </p:cxnSp>
+      <p:cxnSp>
+        <p:nvCxnSpPr>
+          <p:cNvPr id="42" name="Straight Connector 41"/>
+          <p:cNvCxnSpPr/>
+          <p:nvPr/>
+        </p:nvCxnSpPr>
+        <p:spPr>
+          <a:xfrm>
+            <a:off x="4606925" y="1362075"/>
+            <a:ext cx="857250" cy="0"/>
+          </a:xfrm>
+          <a:prstGeom prst="line">
+            <a:avLst/>
+          </a:prstGeom>
+          <a:ln w="28575">
+            <a:solidFill>
+              <a:srgbClr val="00B0F0"/>
+            </a:solidFill>
+          </a:ln>
+        </p:spPr>
+        <p:style>
+          <a:lnRef idx="3">
+            <a:schemeClr val="accent2"/>
+          </a:lnRef>
+          <a:fillRef idx="0">
+            <a:schemeClr val="accent2"/>
+          </a:fillRef>
+          <a:effectRef idx="2">
+            <a:schemeClr val="accent2"/>
+          </a:effectRef>
+          <a:fontRef idx="minor">
+            <a:schemeClr val="tx1"/>
+          </a:fontRef>
+        </p:style>
+      </p:cxnSp>
+      <p:cxnSp>
+        <p:nvCxnSpPr>
+          <p:cNvPr id="43" name="Straight Connector 42"/>
+          <p:cNvCxnSpPr/>
+          <p:nvPr/>
+        </p:nvCxnSpPr>
+        <p:spPr>
+          <a:xfrm>
+            <a:off x="4445000" y="1508125"/>
+            <a:ext cx="1000125" cy="0"/>
+          </a:xfrm>
+          <a:prstGeom prst="line">
+            <a:avLst/>
+          </a:prstGeom>
+          <a:ln w="28575">
+            <a:solidFill>
+              <a:srgbClr val="00B0F0"/>
+            </a:solidFill>
+          </a:ln>
+        </p:spPr>
+        <p:style>
+          <a:lnRef idx="3">
+            <a:schemeClr val="accent2"/>
+          </a:lnRef>
+          <a:fillRef idx="0">
+            <a:schemeClr val="accent2"/>
+          </a:fillRef>
+          <a:effectRef idx="2">
+            <a:schemeClr val="accent2"/>
+          </a:effectRef>
+          <a:fontRef idx="minor">
+            <a:schemeClr val="tx1"/>
+          </a:fontRef>
+        </p:style>
+      </p:cxnSp>
+      <p:cxnSp>
+        <p:nvCxnSpPr>
+          <p:cNvPr id="44" name="Straight Connector 43"/>
+          <p:cNvCxnSpPr/>
+          <p:nvPr/>
+        </p:nvCxnSpPr>
+        <p:spPr>
+          <a:xfrm>
+            <a:off x="4968875" y="1654175"/>
+            <a:ext cx="355600" cy="0"/>
+          </a:xfrm>
+          <a:prstGeom prst="line">
+            <a:avLst/>
+          </a:prstGeom>
+          <a:ln w="28575">
+            <a:solidFill>
+              <a:srgbClr val="00B0F0"/>
+            </a:solidFill>
+          </a:ln>
+        </p:spPr>
+        <p:style>
+          <a:lnRef idx="3">
+            <a:schemeClr val="accent2"/>
+          </a:lnRef>
+          <a:fillRef idx="0">
+            <a:schemeClr val="accent2"/>
+          </a:fillRef>
+          <a:effectRef idx="2">
+            <a:schemeClr val="accent2"/>
+          </a:effectRef>
+          <a:fontRef idx="minor">
+            <a:schemeClr val="tx1"/>
+          </a:fontRef>
+        </p:style>
+      </p:cxnSp>
+      <p:sp>
+        <p:nvSpPr>
+          <p:cNvPr id="45" name="Rounded Rectangle 44"/>
+          <p:cNvSpPr/>
+          <p:nvPr/>
+        </p:nvSpPr>
+        <p:spPr>
+          <a:xfrm>
+            <a:off x="5597525" y="1143000"/>
+            <a:ext cx="4029075" cy="590550"/>
+          </a:xfrm>
+          <a:prstGeom prst="roundRect">
+            <a:avLst/>
+          </a:prstGeom>
+          <a:noFill/>
+          <a:ln>
+            <a:solidFill>
+              <a:srgbClr val="00B0F0"/>
+            </a:solidFill>
+          </a:ln>
+        </p:spPr>
+        <p:style>
+          <a:lnRef idx="2">
+            <a:schemeClr val="accent1">
+              <a:shade val="50000"/>
+            </a:schemeClr>
+          </a:lnRef>
+          <a:fillRef idx="1">
+            <a:schemeClr val="accent1"/>
+          </a:fillRef>
+          <a:effectRef idx="0">
+            <a:schemeClr val="accent1"/>
+          </a:effectRef>
+          <a:fontRef idx="minor">
+            <a:schemeClr val="lt1"/>
+          </a:fontRef>
+        </p:style>
+        <p:txBody>
+          <a:bodyPr rtlCol="0" anchor="ctr"/>
+          <a:p>
+            <a:pPr algn="ctr"/>
+            <a:endParaRPr lang="en-US"/>
+          </a:p>
+        </p:txBody>
+      </p:sp>
+      <p:cxnSp>
+        <p:nvCxnSpPr>
+          <p:cNvPr id="47" name="Straight Connector 46"/>
+          <p:cNvCxnSpPr/>
+          <p:nvPr/>
+        </p:nvCxnSpPr>
+        <p:spPr>
+          <a:xfrm>
+            <a:off x="10126980" y="2822575"/>
+            <a:ext cx="206375" cy="0"/>
+          </a:xfrm>
+          <a:prstGeom prst="line">
+            <a:avLst/>
+          </a:prstGeom>
+          <a:ln w="63500">
+            <a:solidFill>
+              <a:srgbClr val="00B0F0"/>
+            </a:solidFill>
+          </a:ln>
+        </p:spPr>
+        <p:style>
+          <a:lnRef idx="3">
+            <a:schemeClr val="accent2"/>
+          </a:lnRef>
+          <a:fillRef idx="0">
+            <a:schemeClr val="accent2"/>
+          </a:fillRef>
+          <a:effectRef idx="2">
+            <a:schemeClr val="accent2"/>
+          </a:effectRef>
+          <a:fontRef idx="minor">
+            <a:schemeClr val="tx1"/>
+          </a:fontRef>
+        </p:style>
+      </p:cxnSp>
+      <p:cxnSp>
+        <p:nvCxnSpPr>
+          <p:cNvPr id="48" name="Straight Connector 47"/>
+          <p:cNvCxnSpPr/>
+          <p:nvPr/>
+        </p:nvCxnSpPr>
+        <p:spPr>
+          <a:xfrm>
+            <a:off x="10139680" y="3140075"/>
+            <a:ext cx="206375" cy="0"/>
+          </a:xfrm>
+          <a:prstGeom prst="line">
+            <a:avLst/>
+          </a:prstGeom>
+          <a:ln w="63500">
+            <a:solidFill>
+              <a:srgbClr val="C00000"/>
+            </a:solidFill>
+          </a:ln>
+        </p:spPr>
+        <p:style>
+          <a:lnRef idx="3">
+            <a:schemeClr val="accent2"/>
+          </a:lnRef>
+          <a:fillRef idx="0">
+            <a:schemeClr val="accent2"/>
+          </a:fillRef>
+          <a:effectRef idx="2">
+            <a:schemeClr val="accent2"/>
+          </a:effectRef>
+          <a:fontRef idx="minor">
+            <a:schemeClr val="tx1"/>
+          </a:fontRef>
+        </p:style>
+      </p:cxnSp>
+      <p:sp>
+        <p:nvSpPr>
+          <p:cNvPr id="49" name="Text Box 48"/>
+          <p:cNvSpPr txBox="1"/>
+          <p:nvPr/>
+        </p:nvSpPr>
+        <p:spPr>
+          <a:xfrm>
+            <a:off x="10358755" y="2613025"/>
+            <a:ext cx="1009015" cy="368300"/>
+          </a:xfrm>
+          <a:prstGeom prst="rect">
+            <a:avLst/>
+          </a:prstGeom>
+          <a:noFill/>
+        </p:spPr>
+        <p:txBody>
+          <a:bodyPr wrap="none" rtlCol="0">
+            <a:spAutoFit/>
+          </a:bodyPr>
+          <a:p>
+            <a:r>
+              <a:rPr lang="" altLang="en-US">
+                <a:solidFill>
+                  <a:srgbClr val="00B0F0"/>
+                </a:solidFill>
+              </a:rPr>
+              <a:t>attribute</a:t>
+            </a:r>
+            <a:endParaRPr lang="" altLang="en-US">
+              <a:solidFill>
+                <a:srgbClr val="00B0F0"/>
+              </a:solidFill>
+            </a:endParaRPr>
+          </a:p>
+        </p:txBody>
+      </p:sp>
+      <p:sp>
+        <p:nvSpPr>
+          <p:cNvPr id="50" name="Text Box 49"/>
+          <p:cNvSpPr txBox="1"/>
+          <p:nvPr/>
+        </p:nvSpPr>
+        <p:spPr>
+          <a:xfrm>
+            <a:off x="10371455" y="2905125"/>
+            <a:ext cx="589280" cy="368300"/>
+          </a:xfrm>
+          <a:prstGeom prst="rect">
+            <a:avLst/>
+          </a:prstGeom>
+          <a:noFill/>
+        </p:spPr>
+        <p:txBody>
+          <a:bodyPr wrap="none" rtlCol="0">
+            <a:spAutoFit/>
+          </a:bodyPr>
+          <a:p>
+            <a:r>
+              <a:rPr lang="" altLang="en-US">
+                <a:solidFill>
+                  <a:srgbClr val="C00000"/>
+                </a:solidFill>
+              </a:rPr>
+              <a:t>dust</a:t>
+            </a:r>
+            <a:endParaRPr lang="" altLang="en-US">
+              <a:solidFill>
+                <a:srgbClr val="C00000"/>
+              </a:solidFill>
+            </a:endParaRPr>
+          </a:p>
+        </p:txBody>
+      </p:sp>
     </p:spTree>
   </p:cSld>
   <p:clrMapOvr>
@@ -3558,4 +5520,263 @@
     </a:ext>
   </a:extLst>
 </a:theme>
+</file>
+
+<file path=ppt/theme/theme2.xml><?xml version="1.0" encoding="utf-8"?>
+<a:theme xmlns:a="http://schemas.openxmlformats.org/drawingml/2006/main" name="Office Theme">
+  <a:themeElements>
+    <a:clrScheme name="Office">
+      <a:dk1>
+        <a:sysClr val="windowText" lastClr="000000"/>
+      </a:dk1>
+      <a:lt1>
+        <a:sysClr val="window" lastClr="FFFFFF"/>
+      </a:lt1>
+      <a:dk2>
+        <a:srgbClr val="44546A"/>
+      </a:dk2>
+      <a:lt2>
+        <a:srgbClr val="E7E6E6"/>
+      </a:lt2>
+      <a:accent1>
+        <a:srgbClr val="5B9BD5"/>
+      </a:accent1>
+      <a:accent2>
+        <a:srgbClr val="ED7D31"/>
+      </a:accent2>
+      <a:accent3>
+        <a:srgbClr val="A5A5A5"/>
+      </a:accent3>
+      <a:accent4>
+        <a:srgbClr val="FFC000"/>
+      </a:accent4>
+      <a:accent5>
+        <a:srgbClr val="4472C4"/>
+      </a:accent5>
+      <a:accent6>
+        <a:srgbClr val="70AD47"/>
+      </a:accent6>
+      <a:hlink>
+        <a:srgbClr val="0563C1"/>
+      </a:hlink>
+      <a:folHlink>
+        <a:srgbClr val="954F72"/>
+      </a:folHlink>
+    </a:clrScheme>
+    <a:fontScheme name="Office">
+      <a:majorFont>
+        <a:latin typeface="Calibri Light"/>
+        <a:ea typeface=""/>
+        <a:cs typeface=""/>
+        <a:font script="Jpan" typeface="ＭＳ Ｐゴシック"/>
+        <a:font script="Hang" typeface="맑은 고딕"/>
+        <a:font script="Hans" typeface="宋体"/>
+        <a:font script="Hant" typeface="新細明體"/>
+        <a:font script="Arab" typeface="Times New Roman"/>
+        <a:font script="Hebr" typeface="Times New Roman"/>
+        <a:font script="Thai" typeface="Angsana New"/>
+        <a:font script="Ethi" typeface="Nyala"/>
+        <a:font script="Beng" typeface="Vrinda"/>
+        <a:font script="Gujr" typeface="Shruti"/>
+        <a:font script="Khmr" typeface="MoolBoran"/>
+        <a:font script="Knda" typeface="Tunga"/>
+        <a:font script="Guru" typeface="Raavi"/>
+        <a:font script="Cans" typeface="Euphemia"/>
+        <a:font script="Cher" typeface="Plantagenet Cherokee"/>
+        <a:font script="Yiii" typeface="Microsoft Yi Baiti"/>
+        <a:font script="Tibt" typeface="Microsoft Himalaya"/>
+        <a:font script="Thaa" typeface="MV Boli"/>
+        <a:font script="Deva" typeface="Mangal"/>
+        <a:font script="Telu" typeface="Gautami"/>
+        <a:font script="Taml" typeface="Latha"/>
+        <a:font script="Syrc" typeface="Estrangelo Edessa"/>
+        <a:font script="Orya" typeface="Kalinga"/>
+        <a:font script="Mlym" typeface="Kartika"/>
+        <a:font script="Laoo" typeface="DokChampa"/>
+        <a:font script="Sinh" typeface="Iskoola Pota"/>
+        <a:font script="Mong" typeface="Mongolian Baiti"/>
+        <a:font script="Viet" typeface="Times New Roman"/>
+        <a:font script="Uigh" typeface="Microsoft Uighur"/>
+        <a:font script="Geor" typeface="Sylfaen"/>
+      </a:majorFont>
+      <a:minorFont>
+        <a:latin typeface="Calibri"/>
+        <a:ea typeface=""/>
+        <a:cs typeface=""/>
+        <a:font script="Jpan" typeface="ＭＳ Ｐゴシック"/>
+        <a:font script="Hang" typeface="맑은 고딕"/>
+        <a:font script="Hans" typeface="宋体"/>
+        <a:font script="Hant" typeface="新細明體"/>
+        <a:font script="Arab" typeface="Arial"/>
+        <a:font script="Hebr" typeface="Arial"/>
+        <a:font script="Thai" typeface="Cordia New"/>
+        <a:font script="Ethi" typeface="Nyala"/>
+        <a:font script="Beng" typeface="Vrinda"/>
+        <a:font script="Gujr" typeface="Shruti"/>
+        <a:font script="Khmr" typeface="DaunPenh"/>
+        <a:font script="Knda" typeface="Tunga"/>
+        <a:font script="Guru" typeface="Raavi"/>
+        <a:font script="Cans" typeface="Euphemia"/>
+        <a:font script="Cher" typeface="Plantagenet Cherokee"/>
+        <a:font script="Yiii" typeface="Microsoft Yi Baiti"/>
+        <a:font script="Tibt" typeface="Microsoft Himalaya"/>
+        <a:font script="Thaa" typeface="MV Boli"/>
+        <a:font script="Deva" typeface="Mangal"/>
+        <a:font script="Telu" typeface="Gautami"/>
+        <a:font script="Taml" typeface="Latha"/>
+        <a:font script="Syrc" typeface="Estrangelo Edessa"/>
+        <a:font script="Orya" typeface="Kalinga"/>
+        <a:font script="Mlym" typeface="Kartika"/>
+        <a:font script="Laoo" typeface="DokChampa"/>
+        <a:font script="Sinh" typeface="Iskoola Pota"/>
+        <a:font script="Mong" typeface="Mongolian Baiti"/>
+        <a:font script="Viet" typeface="Arial"/>
+        <a:font script="Uigh" typeface="Microsoft Uighur"/>
+        <a:font script="Geor" typeface="Sylfaen"/>
+      </a:minorFont>
+    </a:fontScheme>
+    <a:fmtScheme name="Office">
+      <a:fillStyleLst>
+        <a:solidFill>
+          <a:schemeClr val="phClr"/>
+        </a:solidFill>
+        <a:gradFill rotWithShape="1">
+          <a:gsLst>
+            <a:gs pos="0">
+              <a:schemeClr val="phClr">
+                <a:lumMod val="110000"/>
+                <a:satMod val="105000"/>
+                <a:tint val="67000"/>
+              </a:schemeClr>
+            </a:gs>
+            <a:gs pos="50000">
+              <a:schemeClr val="phClr">
+                <a:lumMod val="105000"/>
+                <a:satMod val="103000"/>
+                <a:tint val="73000"/>
+              </a:schemeClr>
+            </a:gs>
+            <a:gs pos="100000">
+              <a:schemeClr val="phClr">
+                <a:lumMod val="105000"/>
+                <a:satMod val="109000"/>
+                <a:tint val="81000"/>
+              </a:schemeClr>
+            </a:gs>
+          </a:gsLst>
+          <a:lin ang="5400000" scaled="0"/>
+        </a:gradFill>
+        <a:gradFill rotWithShape="1">
+          <a:gsLst>
+            <a:gs pos="0">
+              <a:schemeClr val="phClr">
+                <a:satMod val="103000"/>
+                <a:lumMod val="102000"/>
+                <a:tint val="94000"/>
+              </a:schemeClr>
+            </a:gs>
+            <a:gs pos="50000">
+              <a:schemeClr val="phClr">
+                <a:satMod val="110000"/>
+                <a:lumMod val="100000"/>
+                <a:shade val="100000"/>
+              </a:schemeClr>
+            </a:gs>
+            <a:gs pos="100000">
+              <a:schemeClr val="phClr">
+                <a:lumMod val="99000"/>
+                <a:satMod val="120000"/>
+                <a:shade val="78000"/>
+              </a:schemeClr>
+            </a:gs>
+          </a:gsLst>
+          <a:lin ang="5400000" scaled="0"/>
+        </a:gradFill>
+      </a:fillStyleLst>
+      <a:lnStyleLst>
+        <a:ln w="6350" cap="flat" cmpd="sng" algn="ctr">
+          <a:solidFill>
+            <a:schemeClr val="phClr"/>
+          </a:solidFill>
+          <a:prstDash val="solid"/>
+          <a:miter lim="800000"/>
+        </a:ln>
+        <a:ln w="12700" cap="flat" cmpd="sng" algn="ctr">
+          <a:solidFill>
+            <a:schemeClr val="phClr"/>
+          </a:solidFill>
+          <a:prstDash val="solid"/>
+          <a:miter lim="800000"/>
+        </a:ln>
+        <a:ln w="19050" cap="flat" cmpd="sng" algn="ctr">
+          <a:solidFill>
+            <a:schemeClr val="phClr"/>
+          </a:solidFill>
+          <a:prstDash val="solid"/>
+          <a:miter lim="800000"/>
+        </a:ln>
+      </a:lnStyleLst>
+      <a:effectStyleLst>
+        <a:effectStyle>
+          <a:effectLst/>
+        </a:effectStyle>
+        <a:effectStyle>
+          <a:effectLst/>
+        </a:effectStyle>
+        <a:effectStyle>
+          <a:effectLst>
+            <a:outerShdw blurRad="57150" dist="19050" dir="5400000" algn="ctr" rotWithShape="0">
+              <a:srgbClr val="000000">
+                <a:alpha val="63000"/>
+              </a:srgbClr>
+            </a:outerShdw>
+          </a:effectLst>
+        </a:effectStyle>
+      </a:effectStyleLst>
+      <a:bgFillStyleLst>
+        <a:solidFill>
+          <a:schemeClr val="phClr"/>
+        </a:solidFill>
+        <a:solidFill>
+          <a:schemeClr val="phClr">
+            <a:tint val="95000"/>
+            <a:satMod val="170000"/>
+          </a:schemeClr>
+        </a:solidFill>
+        <a:gradFill rotWithShape="1">
+          <a:gsLst>
+            <a:gs pos="0">
+              <a:schemeClr val="phClr">
+                <a:tint val="93000"/>
+                <a:satMod val="150000"/>
+                <a:shade val="98000"/>
+                <a:lumMod val="102000"/>
+              </a:schemeClr>
+            </a:gs>
+            <a:gs pos="50000">
+              <a:schemeClr val="phClr">
+                <a:tint val="98000"/>
+                <a:satMod val="130000"/>
+                <a:shade val="90000"/>
+                <a:lumMod val="103000"/>
+              </a:schemeClr>
+            </a:gs>
+            <a:gs pos="100000">
+              <a:schemeClr val="phClr">
+                <a:shade val="63000"/>
+                <a:satMod val="120000"/>
+              </a:schemeClr>
+            </a:gs>
+          </a:gsLst>
+          <a:lin ang="5400000" scaled="0"/>
+        </a:gradFill>
+      </a:bgFillStyleLst>
+    </a:fmtScheme>
+  </a:themeElements>
+  <a:extLst>
+    <a:ext uri="{05A4C25C-085E-4340-85A3-A5531E510DB2}">
+      <thm15:themeFamily xmlns:thm15="http://schemas.microsoft.com/office/thememl/2012/main" name="Office Theme" id="{62F939B6-93AF-4DB8-9C6B-D6C7DFDC589F}" vid="{4A3C46E8-61CC-4603-A589-7422A47A8E4A}"/>
+    </a:ext>
+  </a:extLst>
+</a:theme>
 </file>
</xml_diff>